<commit_message>
pitch ninjaball copy contains the notes and most up to date images
</commit_message>
<xml_diff>
--- a/pitchNinja Ball.pptx
+++ b/pitchNinja Ball.pptx
@@ -4,6 +4,9 @@
   <p:sldMasterIdLst>
     <p:sldMasterId id="2147483648" r:id="rId1"/>
   </p:sldMasterIdLst>
+  <p:notesMasterIdLst>
+    <p:notesMasterId r:id="rId11"/>
+  </p:notesMasterIdLst>
   <p:sldIdLst>
     <p:sldId id="256" r:id="rId2"/>
     <p:sldId id="257" r:id="rId3"/>
@@ -124,6 +127,7 @@
 <p1510:revInfo xmlns:a="http://schemas.openxmlformats.org/drawingml/2006/main" xmlns:r="http://schemas.openxmlformats.org/officeDocument/2006/relationships" xmlns:p1510="http://schemas.microsoft.com/office/powerpoint/2015/10/main">
   <p1510:revLst>
     <p1510:client id="{A5B6DC77-09AD-4751-92D6-337F352E993D}" v="4" dt="2020-02-24T13:37:57.364"/>
+    <p1510:client id="{F08427A6-8B71-493E-B162-D47B7290B57C}" v="22" dt="2020-02-27T16:39:35.357"/>
   </p1510:revLst>
 </p1510:revInfo>
 </file>
@@ -315,7 +319,697 @@
       </pc:sldChg>
     </pc:docChg>
   </pc:docChgLst>
+  <pc:docChgLst>
+    <pc:chgData name="Tommy Crowley" userId="de8edd34cec55636" providerId="Windows Live" clId="Web-{F08427A6-8B71-493E-B162-D47B7290B57C}"/>
+    <pc:docChg chg="modSld">
+      <pc:chgData name="Tommy Crowley" userId="de8edd34cec55636" providerId="Windows Live" clId="Web-{F08427A6-8B71-493E-B162-D47B7290B57C}" dt="2020-02-27T16:47:33.920" v="552"/>
+      <pc:docMkLst>
+        <pc:docMk/>
+      </pc:docMkLst>
+      <pc:sldChg chg="modSp modNotes">
+        <pc:chgData name="Tommy Crowley" userId="de8edd34cec55636" providerId="Windows Live" clId="Web-{F08427A6-8B71-493E-B162-D47B7290B57C}" dt="2020-02-27T16:44:33.904" v="536"/>
+        <pc:sldMkLst>
+          <pc:docMk/>
+          <pc:sldMk cId="4156524245" sldId="257"/>
+        </pc:sldMkLst>
+        <pc:spChg chg="mod">
+          <ac:chgData name="Tommy Crowley" userId="de8edd34cec55636" providerId="Windows Live" clId="Web-{F08427A6-8B71-493E-B162-D47B7290B57C}" dt="2020-02-27T16:39:17.638" v="492" actId="20577"/>
+          <ac:spMkLst>
+            <pc:docMk/>
+            <pc:sldMk cId="4156524245" sldId="257"/>
+            <ac:spMk id="3" creationId="{5F508147-92F8-4D2D-89A3-AD0EF1E8D241}"/>
+          </ac:spMkLst>
+        </pc:spChg>
+      </pc:sldChg>
+      <pc:sldChg chg="modSp modNotes">
+        <pc:chgData name="Tommy Crowley" userId="de8edd34cec55636" providerId="Windows Live" clId="Web-{F08427A6-8B71-493E-B162-D47B7290B57C}" dt="2020-02-27T16:47:33.920" v="552"/>
+        <pc:sldMkLst>
+          <pc:docMk/>
+          <pc:sldMk cId="151082320" sldId="263"/>
+        </pc:sldMkLst>
+        <pc:spChg chg="mod">
+          <ac:chgData name="Tommy Crowley" userId="de8edd34cec55636" providerId="Windows Live" clId="Web-{F08427A6-8B71-493E-B162-D47B7290B57C}" dt="2020-02-27T15:39:47.745" v="451" actId="20577"/>
+          <ac:spMkLst>
+            <pc:docMk/>
+            <pc:sldMk cId="151082320" sldId="263"/>
+            <ac:spMk id="3" creationId="{9E18A99B-04CA-4393-BC72-53FD98C5B780}"/>
+          </ac:spMkLst>
+        </pc:spChg>
+      </pc:sldChg>
+      <pc:sldChg chg="addSp modSp mod setBg setClrOvrMap">
+        <pc:chgData name="Tommy Crowley" userId="de8edd34cec55636" providerId="Windows Live" clId="Web-{F08427A6-8B71-493E-B162-D47B7290B57C}" dt="2020-02-27T15:09:49.455" v="2"/>
+        <pc:sldMkLst>
+          <pc:docMk/>
+          <pc:sldMk cId="2420233417" sldId="265"/>
+        </pc:sldMkLst>
+        <pc:spChg chg="mod">
+          <ac:chgData name="Tommy Crowley" userId="de8edd34cec55636" providerId="Windows Live" clId="Web-{F08427A6-8B71-493E-B162-D47B7290B57C}" dt="2020-02-27T15:09:49.455" v="2"/>
+          <ac:spMkLst>
+            <pc:docMk/>
+            <pc:sldMk cId="2420233417" sldId="265"/>
+            <ac:spMk id="2" creationId="{19F8F2E0-208C-47F2-AB9A-77F0F3038A30}"/>
+          </ac:spMkLst>
+        </pc:spChg>
+        <pc:spChg chg="mod ord">
+          <ac:chgData name="Tommy Crowley" userId="de8edd34cec55636" providerId="Windows Live" clId="Web-{F08427A6-8B71-493E-B162-D47B7290B57C}" dt="2020-02-27T15:09:49.455" v="2"/>
+          <ac:spMkLst>
+            <pc:docMk/>
+            <pc:sldMk cId="2420233417" sldId="265"/>
+            <ac:spMk id="3" creationId="{A7E9EDFB-68D8-480B-A5EB-98162DFAB6C4}"/>
+          </ac:spMkLst>
+        </pc:spChg>
+        <pc:spChg chg="add">
+          <ac:chgData name="Tommy Crowley" userId="de8edd34cec55636" providerId="Windows Live" clId="Web-{F08427A6-8B71-493E-B162-D47B7290B57C}" dt="2020-02-27T15:09:49.455" v="2"/>
+          <ac:spMkLst>
+            <pc:docMk/>
+            <pc:sldMk cId="2420233417" sldId="265"/>
+            <ac:spMk id="10" creationId="{FC485557-E744-401B-A251-3650FAEEAD8E}"/>
+          </ac:spMkLst>
+        </pc:spChg>
+        <pc:spChg chg="add">
+          <ac:chgData name="Tommy Crowley" userId="de8edd34cec55636" providerId="Windows Live" clId="Web-{F08427A6-8B71-493E-B162-D47B7290B57C}" dt="2020-02-27T15:09:49.455" v="2"/>
+          <ac:spMkLst>
+            <pc:docMk/>
+            <pc:sldMk cId="2420233417" sldId="265"/>
+            <ac:spMk id="12" creationId="{986D68AF-6B45-4B98-8634-61D8C9C05662}"/>
+          </ac:spMkLst>
+        </pc:spChg>
+        <pc:spChg chg="add">
+          <ac:chgData name="Tommy Crowley" userId="de8edd34cec55636" providerId="Windows Live" clId="Web-{F08427A6-8B71-493E-B162-D47B7290B57C}" dt="2020-02-27T15:09:49.455" v="2"/>
+          <ac:spMkLst>
+            <pc:docMk/>
+            <pc:sldMk cId="2420233417" sldId="265"/>
+            <ac:spMk id="14" creationId="{0143DE54-7BFF-4B29-8566-DF80EE4CCB07}"/>
+          </ac:spMkLst>
+        </pc:spChg>
+        <pc:spChg chg="add">
+          <ac:chgData name="Tommy Crowley" userId="de8edd34cec55636" providerId="Windows Live" clId="Web-{F08427A6-8B71-493E-B162-D47B7290B57C}" dt="2020-02-27T15:09:49.455" v="2"/>
+          <ac:spMkLst>
+            <pc:docMk/>
+            <pc:sldMk cId="2420233417" sldId="265"/>
+            <ac:spMk id="16" creationId="{7C661810-D461-4214-A635-30A7D1714054}"/>
+          </ac:spMkLst>
+        </pc:spChg>
+        <pc:spChg chg="add">
+          <ac:chgData name="Tommy Crowley" userId="de8edd34cec55636" providerId="Windows Live" clId="Web-{F08427A6-8B71-493E-B162-D47B7290B57C}" dt="2020-02-27T15:09:49.455" v="2"/>
+          <ac:spMkLst>
+            <pc:docMk/>
+            <pc:sldMk cId="2420233417" sldId="265"/>
+            <ac:spMk id="18" creationId="{ED6475A3-FF98-4FA0-B527-600EBA9BD68F}"/>
+          </ac:spMkLst>
+        </pc:spChg>
+        <pc:picChg chg="add mod">
+          <ac:chgData name="Tommy Crowley" userId="de8edd34cec55636" providerId="Windows Live" clId="Web-{F08427A6-8B71-493E-B162-D47B7290B57C}" dt="2020-02-27T15:09:49.455" v="2"/>
+          <ac:picMkLst>
+            <pc:docMk/>
+            <pc:sldMk cId="2420233417" sldId="265"/>
+            <ac:picMk id="4" creationId="{A3DE7060-4C12-42BE-80B4-056C4A64FC40}"/>
+          </ac:picMkLst>
+        </pc:picChg>
+        <pc:picChg chg="mod ord">
+          <ac:chgData name="Tommy Crowley" userId="de8edd34cec55636" providerId="Windows Live" clId="Web-{F08427A6-8B71-493E-B162-D47B7290B57C}" dt="2020-02-27T15:09:49.455" v="2"/>
+          <ac:picMkLst>
+            <pc:docMk/>
+            <pc:sldMk cId="2420233417" sldId="265"/>
+            <ac:picMk id="5" creationId="{57B78E8E-705E-472F-B06E-4192588CFDF3}"/>
+          </ac:picMkLst>
+        </pc:picChg>
+      </pc:sldChg>
+    </pc:docChg>
+  </pc:docChgLst>
 </pc:chgInfo>
+</file>
+
+<file path=ppt/notesMasters/notesMaster1.xml><?xml version="1.0" encoding="utf-8"?>
+<p:notesMaster xmlns:a="http://schemas.openxmlformats.org/drawingml/2006/main" xmlns:r="http://schemas.openxmlformats.org/officeDocument/2006/relationships" xmlns:p="http://schemas.openxmlformats.org/presentationml/2006/main">
+  <p:cSld>
+    <p:bg>
+      <p:bgRef idx="1001">
+        <a:schemeClr val="bg1"/>
+      </p:bgRef>
+    </p:bg>
+    <p:spTree>
+      <p:nvGrpSpPr>
+        <p:cNvPr id="1" name=""/>
+        <p:cNvGrpSpPr/>
+        <p:nvPr/>
+      </p:nvGrpSpPr>
+      <p:grpSpPr>
+        <a:xfrm>
+          <a:off x="0" y="0"/>
+          <a:ext cx="0" cy="0"/>
+          <a:chOff x="0" y="0"/>
+          <a:chExt cx="0" cy="0"/>
+        </a:xfrm>
+      </p:grpSpPr>
+      <p:sp>
+        <p:nvSpPr>
+          <p:cNvPr id="2" name="Header Placeholder 1"/>
+          <p:cNvSpPr>
+            <a:spLocks noGrp="1"/>
+          </p:cNvSpPr>
+          <p:nvPr>
+            <p:ph type="hdr" sz="quarter"/>
+          </p:nvPr>
+        </p:nvSpPr>
+        <p:spPr>
+          <a:xfrm>
+            <a:off x="0" y="0"/>
+            <a:ext cx="2971800" cy="458788"/>
+          </a:xfrm>
+          <a:prstGeom prst="rect">
+            <a:avLst/>
+          </a:prstGeom>
+        </p:spPr>
+        <p:txBody>
+          <a:bodyPr vert="horz" lIns="91440" tIns="45720" rIns="91440" bIns="45720" rtlCol="0"/>
+          <a:lstStyle>
+            <a:lvl1pPr algn="l">
+              <a:defRPr sz="1200"/>
+            </a:lvl1pPr>
+          </a:lstStyle>
+          <a:p>
+            <a:endParaRPr lang="en-US"/>
+          </a:p>
+        </p:txBody>
+      </p:sp>
+      <p:sp>
+        <p:nvSpPr>
+          <p:cNvPr id="3" name="Date Placeholder 2"/>
+          <p:cNvSpPr>
+            <a:spLocks noGrp="1"/>
+          </p:cNvSpPr>
+          <p:nvPr>
+            <p:ph type="dt" idx="1"/>
+          </p:nvPr>
+        </p:nvSpPr>
+        <p:spPr>
+          <a:xfrm>
+            <a:off x="3884613" y="0"/>
+            <a:ext cx="2971800" cy="458788"/>
+          </a:xfrm>
+          <a:prstGeom prst="rect">
+            <a:avLst/>
+          </a:prstGeom>
+        </p:spPr>
+        <p:txBody>
+          <a:bodyPr vert="horz" lIns="91440" tIns="45720" rIns="91440" bIns="45720" rtlCol="0"/>
+          <a:lstStyle>
+            <a:lvl1pPr algn="r">
+              <a:defRPr sz="1200"/>
+            </a:lvl1pPr>
+          </a:lstStyle>
+          <a:p>
+            <a:fld id="{34650F81-CBBD-40B0-A0B9-4B4429516DBB}" type="datetimeFigureOut">
+              <a:rPr lang="en-IE"/>
+              <a:t>27/02/2020</a:t>
+            </a:fld>
+            <a:endParaRPr lang="en-US"/>
+          </a:p>
+        </p:txBody>
+      </p:sp>
+      <p:sp>
+        <p:nvSpPr>
+          <p:cNvPr id="4" name="Slide Image Placeholder 3"/>
+          <p:cNvSpPr>
+            <a:spLocks noGrp="1" noRot="1" noChangeAspect="1"/>
+          </p:cNvSpPr>
+          <p:nvPr>
+            <p:ph type="sldImg" idx="2"/>
+          </p:nvPr>
+        </p:nvSpPr>
+        <p:spPr>
+          <a:xfrm>
+            <a:off x="685800" y="1143000"/>
+            <a:ext cx="5486400" cy="3086100"/>
+          </a:xfrm>
+          <a:prstGeom prst="rect">
+            <a:avLst/>
+          </a:prstGeom>
+          <a:noFill/>
+          <a:ln w="12700">
+            <a:solidFill>
+              <a:prstClr val="black"/>
+            </a:solidFill>
+          </a:ln>
+        </p:spPr>
+        <p:txBody>
+          <a:bodyPr vert="horz" lIns="91440" tIns="45720" rIns="91440" bIns="45720" rtlCol="0" anchor="ctr"/>
+          <a:lstStyle/>
+          <a:p>
+            <a:endParaRPr lang="en-US"/>
+          </a:p>
+        </p:txBody>
+      </p:sp>
+      <p:sp>
+        <p:nvSpPr>
+          <p:cNvPr id="5" name="Notes Placeholder 4"/>
+          <p:cNvSpPr>
+            <a:spLocks noGrp="1"/>
+          </p:cNvSpPr>
+          <p:nvPr>
+            <p:ph type="body" sz="quarter" idx="3"/>
+          </p:nvPr>
+        </p:nvSpPr>
+        <p:spPr>
+          <a:xfrm>
+            <a:off x="685800" y="4400550"/>
+            <a:ext cx="5486400" cy="3600450"/>
+          </a:xfrm>
+          <a:prstGeom prst="rect">
+            <a:avLst/>
+          </a:prstGeom>
+        </p:spPr>
+        <p:txBody>
+          <a:bodyPr vert="horz" lIns="91440" tIns="45720" rIns="91440" bIns="45720" rtlCol="0"/>
+          <a:lstStyle/>
+          <a:p>
+            <a:pPr lvl="0"/>
+            <a:r>
+              <a:rPr lang="en-US"/>
+              <a:t>Click to edit Master text styles</a:t>
+            </a:r>
+          </a:p>
+          <a:p>
+            <a:pPr lvl="1"/>
+            <a:r>
+              <a:rPr lang="en-US"/>
+              <a:t>Second level</a:t>
+            </a:r>
+          </a:p>
+          <a:p>
+            <a:pPr lvl="2"/>
+            <a:r>
+              <a:rPr lang="en-US"/>
+              <a:t>Third level</a:t>
+            </a:r>
+          </a:p>
+          <a:p>
+            <a:pPr lvl="3"/>
+            <a:r>
+              <a:rPr lang="en-US"/>
+              <a:t>Fourth level</a:t>
+            </a:r>
+          </a:p>
+          <a:p>
+            <a:pPr lvl="4"/>
+            <a:r>
+              <a:rPr lang="en-US"/>
+              <a:t>Fifth level</a:t>
+            </a:r>
+          </a:p>
+        </p:txBody>
+      </p:sp>
+      <p:sp>
+        <p:nvSpPr>
+          <p:cNvPr id="6" name="Footer Placeholder 5"/>
+          <p:cNvSpPr>
+            <a:spLocks noGrp="1"/>
+          </p:cNvSpPr>
+          <p:nvPr>
+            <p:ph type="ftr" sz="quarter" idx="4"/>
+          </p:nvPr>
+        </p:nvSpPr>
+        <p:spPr>
+          <a:xfrm>
+            <a:off x="0" y="8685213"/>
+            <a:ext cx="2971800" cy="458787"/>
+          </a:xfrm>
+          <a:prstGeom prst="rect">
+            <a:avLst/>
+          </a:prstGeom>
+        </p:spPr>
+        <p:txBody>
+          <a:bodyPr vert="horz" lIns="91440" tIns="45720" rIns="91440" bIns="45720" rtlCol="0" anchor="b"/>
+          <a:lstStyle>
+            <a:lvl1pPr algn="l">
+              <a:defRPr sz="1200"/>
+            </a:lvl1pPr>
+          </a:lstStyle>
+          <a:p>
+            <a:endParaRPr lang="en-US"/>
+          </a:p>
+        </p:txBody>
+      </p:sp>
+      <p:sp>
+        <p:nvSpPr>
+          <p:cNvPr id="7" name="Slide Number Placeholder 6"/>
+          <p:cNvSpPr>
+            <a:spLocks noGrp="1"/>
+          </p:cNvSpPr>
+          <p:nvPr>
+            <p:ph type="sldNum" sz="quarter" idx="5"/>
+          </p:nvPr>
+        </p:nvSpPr>
+        <p:spPr>
+          <a:xfrm>
+            <a:off x="3884613" y="8685213"/>
+            <a:ext cx="2971800" cy="458787"/>
+          </a:xfrm>
+          <a:prstGeom prst="rect">
+            <a:avLst/>
+          </a:prstGeom>
+        </p:spPr>
+        <p:txBody>
+          <a:bodyPr vert="horz" lIns="91440" tIns="45720" rIns="91440" bIns="45720" rtlCol="0" anchor="b"/>
+          <a:lstStyle>
+            <a:lvl1pPr algn="r">
+              <a:defRPr sz="1200"/>
+            </a:lvl1pPr>
+          </a:lstStyle>
+          <a:p>
+            <a:fld id="{EE6ABC4C-EDD6-47DB-A029-25BC624D3359}" type="slidenum">
+              <a:rPr lang="en-IE"/>
+              <a:t>‹#›</a:t>
+            </a:fld>
+            <a:endParaRPr lang="en-US"/>
+          </a:p>
+        </p:txBody>
+      </p:sp>
+    </p:spTree>
+    <p:extLst>
+      <p:ext uri="{BB962C8B-B14F-4D97-AF65-F5344CB8AC3E}">
+        <p14:creationId xmlns:p14="http://schemas.microsoft.com/office/powerpoint/2010/main" val="4233183768"/>
+      </p:ext>
+    </p:extLst>
+  </p:cSld>
+  <p:clrMap bg1="lt1" tx1="dk1" bg2="lt2" tx2="dk2" accent1="accent1" accent2="accent2" accent3="accent3" accent4="accent4" accent5="accent5" accent6="accent6" hlink="hlink" folHlink="folHlink"/>
+  <p:notesStyle>
+    <a:lvl1pPr marL="0" algn="l" defTabSz="914400" rtl="0" eaLnBrk="1" latinLnBrk="0" hangingPunct="1">
+      <a:defRPr sz="1200" kern="1200">
+        <a:solidFill>
+          <a:schemeClr val="tx1"/>
+        </a:solidFill>
+        <a:latin typeface="+mn-lt"/>
+        <a:ea typeface="+mn-ea"/>
+        <a:cs typeface="+mn-cs"/>
+      </a:defRPr>
+    </a:lvl1pPr>
+    <a:lvl2pPr marL="457200" algn="l" defTabSz="914400" rtl="0" eaLnBrk="1" latinLnBrk="0" hangingPunct="1">
+      <a:defRPr sz="1200" kern="1200">
+        <a:solidFill>
+          <a:schemeClr val="tx1"/>
+        </a:solidFill>
+        <a:latin typeface="+mn-lt"/>
+        <a:ea typeface="+mn-ea"/>
+        <a:cs typeface="+mn-cs"/>
+      </a:defRPr>
+    </a:lvl2pPr>
+    <a:lvl3pPr marL="914400" algn="l" defTabSz="914400" rtl="0" eaLnBrk="1" latinLnBrk="0" hangingPunct="1">
+      <a:defRPr sz="1200" kern="1200">
+        <a:solidFill>
+          <a:schemeClr val="tx1"/>
+        </a:solidFill>
+        <a:latin typeface="+mn-lt"/>
+        <a:ea typeface="+mn-ea"/>
+        <a:cs typeface="+mn-cs"/>
+      </a:defRPr>
+    </a:lvl3pPr>
+    <a:lvl4pPr marL="1371600" algn="l" defTabSz="914400" rtl="0" eaLnBrk="1" latinLnBrk="0" hangingPunct="1">
+      <a:defRPr sz="1200" kern="1200">
+        <a:solidFill>
+          <a:schemeClr val="tx1"/>
+        </a:solidFill>
+        <a:latin typeface="+mn-lt"/>
+        <a:ea typeface="+mn-ea"/>
+        <a:cs typeface="+mn-cs"/>
+      </a:defRPr>
+    </a:lvl4pPr>
+    <a:lvl5pPr marL="1828800" algn="l" defTabSz="914400" rtl="0" eaLnBrk="1" latinLnBrk="0" hangingPunct="1">
+      <a:defRPr sz="1200" kern="1200">
+        <a:solidFill>
+          <a:schemeClr val="tx1"/>
+        </a:solidFill>
+        <a:latin typeface="+mn-lt"/>
+        <a:ea typeface="+mn-ea"/>
+        <a:cs typeface="+mn-cs"/>
+      </a:defRPr>
+    </a:lvl5pPr>
+    <a:lvl6pPr marL="2286000" algn="l" defTabSz="914400" rtl="0" eaLnBrk="1" latinLnBrk="0" hangingPunct="1">
+      <a:defRPr sz="1200" kern="1200">
+        <a:solidFill>
+          <a:schemeClr val="tx1"/>
+        </a:solidFill>
+        <a:latin typeface="+mn-lt"/>
+        <a:ea typeface="+mn-ea"/>
+        <a:cs typeface="+mn-cs"/>
+      </a:defRPr>
+    </a:lvl6pPr>
+    <a:lvl7pPr marL="2743200" algn="l" defTabSz="914400" rtl="0" eaLnBrk="1" latinLnBrk="0" hangingPunct="1">
+      <a:defRPr sz="1200" kern="1200">
+        <a:solidFill>
+          <a:schemeClr val="tx1"/>
+        </a:solidFill>
+        <a:latin typeface="+mn-lt"/>
+        <a:ea typeface="+mn-ea"/>
+        <a:cs typeface="+mn-cs"/>
+      </a:defRPr>
+    </a:lvl7pPr>
+    <a:lvl8pPr marL="3200400" algn="l" defTabSz="914400" rtl="0" eaLnBrk="1" latinLnBrk="0" hangingPunct="1">
+      <a:defRPr sz="1200" kern="1200">
+        <a:solidFill>
+          <a:schemeClr val="tx1"/>
+        </a:solidFill>
+        <a:latin typeface="+mn-lt"/>
+        <a:ea typeface="+mn-ea"/>
+        <a:cs typeface="+mn-cs"/>
+      </a:defRPr>
+    </a:lvl8pPr>
+    <a:lvl9pPr marL="3657600" algn="l" defTabSz="914400" rtl="0" eaLnBrk="1" latinLnBrk="0" hangingPunct="1">
+      <a:defRPr sz="1200" kern="1200">
+        <a:solidFill>
+          <a:schemeClr val="tx1"/>
+        </a:solidFill>
+        <a:latin typeface="+mn-lt"/>
+        <a:ea typeface="+mn-ea"/>
+        <a:cs typeface="+mn-cs"/>
+      </a:defRPr>
+    </a:lvl9pPr>
+  </p:notesStyle>
+</p:notesMaster>
+</file>
+
+<file path=ppt/notesSlides/notesSlide1.xml><?xml version="1.0" encoding="utf-8"?>
+<p:notes xmlns:a="http://schemas.openxmlformats.org/drawingml/2006/main" xmlns:r="http://schemas.openxmlformats.org/officeDocument/2006/relationships" xmlns:p="http://schemas.openxmlformats.org/presentationml/2006/main">
+  <p:cSld>
+    <p:spTree>
+      <p:nvGrpSpPr>
+        <p:cNvPr id="1" name=""/>
+        <p:cNvGrpSpPr/>
+        <p:nvPr/>
+      </p:nvGrpSpPr>
+      <p:grpSpPr>
+        <a:xfrm>
+          <a:off x="0" y="0"/>
+          <a:ext cx="0" cy="0"/>
+          <a:chOff x="0" y="0"/>
+          <a:chExt cx="0" cy="0"/>
+        </a:xfrm>
+      </p:grpSpPr>
+      <p:sp>
+        <p:nvSpPr>
+          <p:cNvPr id="2" name="Slide Image Placeholder 1"/>
+          <p:cNvSpPr>
+            <a:spLocks noGrp="1" noRot="1" noChangeAspect="1"/>
+          </p:cNvSpPr>
+          <p:nvPr>
+            <p:ph type="sldImg"/>
+          </p:nvPr>
+        </p:nvSpPr>
+        <p:spPr/>
+      </p:sp>
+      <p:sp>
+        <p:nvSpPr>
+          <p:cNvPr id="3" name="Notes Placeholder 2"/>
+          <p:cNvSpPr>
+            <a:spLocks noGrp="1"/>
+          </p:cNvSpPr>
+          <p:nvPr>
+            <p:ph type="body" idx="1"/>
+          </p:nvPr>
+        </p:nvSpPr>
+        <p:spPr/>
+        <p:txBody>
+          <a:bodyPr/>
+          <a:lstStyle/>
+          <a:p>
+            <a:r>
+              <a:rPr lang="en-US" dirty="0" err="1">
+                <a:cs typeface="Calibri"/>
+              </a:rPr>
+              <a:t>Ninjaball</a:t>
+            </a:r>
+            <a:r>
+              <a:rPr lang="en-US" dirty="0">
+                <a:cs typeface="Calibri"/>
+              </a:rPr>
+              <a:t> will see you progressing up a series of increasingly challenging levels to reach the top of the tower, the levels will use the vertical space</a:t>
+            </a:r>
+          </a:p>
+          <a:p>
+            <a:r>
+              <a:rPr lang="en-US">
+                <a:cs typeface="Calibri"/>
+              </a:rPr>
+              <a:t>Provided</a:t>
+            </a:r>
+            <a:r>
+              <a:rPr lang="en-US" dirty="0">
+                <a:cs typeface="Calibri"/>
+              </a:rPr>
+              <a:t> by the phone screen to progress onwards, using the environment to your advantage to move through the level. We decided on a pinball theme as we liked the visual and mechanical elements that a pinball game can have with this kind of platformer.</a:t>
+            </a:r>
+          </a:p>
+        </p:txBody>
+      </p:sp>
+      <p:sp>
+        <p:nvSpPr>
+          <p:cNvPr id="4" name="Slide Number Placeholder 3"/>
+          <p:cNvSpPr>
+            <a:spLocks noGrp="1"/>
+          </p:cNvSpPr>
+          <p:nvPr>
+            <p:ph type="sldNum" sz="quarter" idx="5"/>
+          </p:nvPr>
+        </p:nvSpPr>
+        <p:spPr/>
+        <p:txBody>
+          <a:bodyPr/>
+          <a:lstStyle/>
+          <a:p>
+            <a:fld id="{EE6ABC4C-EDD6-47DB-A029-25BC624D3359}" type="slidenum">
+              <a:rPr lang="en-IE"/>
+              <a:t>2</a:t>
+            </a:fld>
+            <a:endParaRPr lang="en-US"/>
+          </a:p>
+        </p:txBody>
+      </p:sp>
+    </p:spTree>
+    <p:extLst>
+      <p:ext uri="{BB962C8B-B14F-4D97-AF65-F5344CB8AC3E}">
+        <p14:creationId xmlns:p14="http://schemas.microsoft.com/office/powerpoint/2010/main" val="3997733016"/>
+      </p:ext>
+    </p:extLst>
+  </p:cSld>
+  <p:clrMapOvr>
+    <a:masterClrMapping/>
+  </p:clrMapOvr>
+</p:notes>
+</file>
+
+<file path=ppt/notesSlides/notesSlide2.xml><?xml version="1.0" encoding="utf-8"?>
+<p:notes xmlns:a="http://schemas.openxmlformats.org/drawingml/2006/main" xmlns:r="http://schemas.openxmlformats.org/officeDocument/2006/relationships" xmlns:p="http://schemas.openxmlformats.org/presentationml/2006/main">
+  <p:cSld>
+    <p:spTree>
+      <p:nvGrpSpPr>
+        <p:cNvPr id="1" name=""/>
+        <p:cNvGrpSpPr/>
+        <p:nvPr/>
+      </p:nvGrpSpPr>
+      <p:grpSpPr>
+        <a:xfrm>
+          <a:off x="0" y="0"/>
+          <a:ext cx="0" cy="0"/>
+          <a:chOff x="0" y="0"/>
+          <a:chExt cx="0" cy="0"/>
+        </a:xfrm>
+      </p:grpSpPr>
+      <p:sp>
+        <p:nvSpPr>
+          <p:cNvPr id="2" name="Slide Image Placeholder 1"/>
+          <p:cNvSpPr>
+            <a:spLocks noGrp="1" noRot="1" noChangeAspect="1"/>
+          </p:cNvSpPr>
+          <p:nvPr>
+            <p:ph type="sldImg"/>
+          </p:nvPr>
+        </p:nvSpPr>
+        <p:spPr/>
+      </p:sp>
+      <p:sp>
+        <p:nvSpPr>
+          <p:cNvPr id="3" name="Notes Placeholder 2"/>
+          <p:cNvSpPr>
+            <a:spLocks noGrp="1"/>
+          </p:cNvSpPr>
+          <p:nvPr>
+            <p:ph type="body" idx="1"/>
+          </p:nvPr>
+        </p:nvSpPr>
+        <p:spPr/>
+        <p:txBody>
+          <a:bodyPr/>
+          <a:lstStyle/>
+          <a:p>
+            <a:r>
+              <a:rPr lang="en-US" dirty="0">
+                <a:cs typeface="Calibri"/>
+              </a:rPr>
+              <a:t>We realised</a:t>
+            </a:r>
+            <a:r>
+              <a:rPr lang="en-US">
+                <a:cs typeface="Calibri"/>
+              </a:rPr>
+              <a:t> that many of the design features seen in pinball games could be used on this kind of platformer to promote fun fast paced gameplay,</a:t>
+            </a:r>
+          </a:p>
+          <a:p>
+            <a:r>
+              <a:rPr lang="en-US">
+                <a:cs typeface="Calibri"/>
+              </a:rPr>
+              <a:t>Flippers, bumpers and springs could be used as obstcales or as a means to move through the level</a:t>
+            </a:r>
+            <a:endParaRPr lang="en-US" dirty="0">
+              <a:cs typeface="Calibri"/>
+            </a:endParaRPr>
+          </a:p>
+          <a:p>
+            <a:r>
+              <a:rPr lang="en-US" dirty="0">
+                <a:cs typeface="Calibri"/>
+              </a:rPr>
+              <a:t> </a:t>
+            </a:r>
+          </a:p>
+        </p:txBody>
+      </p:sp>
+      <p:sp>
+        <p:nvSpPr>
+          <p:cNvPr id="4" name="Slide Number Placeholder 3"/>
+          <p:cNvSpPr>
+            <a:spLocks noGrp="1"/>
+          </p:cNvSpPr>
+          <p:nvPr>
+            <p:ph type="sldNum" sz="quarter" idx="5"/>
+          </p:nvPr>
+        </p:nvSpPr>
+        <p:spPr/>
+        <p:txBody>
+          <a:bodyPr/>
+          <a:lstStyle/>
+          <a:p>
+            <a:fld id="{EE6ABC4C-EDD6-47DB-A029-25BC624D3359}" type="slidenum">
+              <a:rPr lang="en-IE"/>
+              <a:t>3</a:t>
+            </a:fld>
+            <a:endParaRPr lang="en-US"/>
+          </a:p>
+        </p:txBody>
+      </p:sp>
+    </p:spTree>
+    <p:extLst>
+      <p:ext uri="{BB962C8B-B14F-4D97-AF65-F5344CB8AC3E}">
+        <p14:creationId xmlns:p14="http://schemas.microsoft.com/office/powerpoint/2010/main" val="3961680121"/>
+      </p:ext>
+    </p:extLst>
+  </p:cSld>
+  <p:clrMapOvr>
+    <a:masterClrMapping/>
+  </p:clrMapOvr>
+</p:notes>
 </file>
 
 <file path=ppt/slideLayouts/slideLayout1.xml><?xml version="1.0" encoding="utf-8"?>
@@ -13612,7 +14306,7 @@
           </a:xfrm>
         </p:spPr>
         <p:txBody>
-          <a:bodyPr>
+          <a:bodyPr vert="horz" lIns="91440" tIns="45720" rIns="91440" bIns="45720" rtlCol="0" anchor="t">
             <a:normAutofit/>
           </a:bodyPr>
           <a:lstStyle/>
@@ -13634,8 +14328,8 @@
               </a:lnSpc>
             </a:pPr>
             <a:r>
-              <a:rPr lang="en-GB" dirty="0"/>
-              <a:t>Fun levels full of obstacles pinball inspired obstacles.</a:t>
+              <a:rPr lang="en-GB"/>
+              <a:t>Fun levels full of pinball inspired obstacles.</a:t>
             </a:r>
           </a:p>
           <a:p>
@@ -13750,7 +14444,9 @@
           </a:xfrm>
         </p:spPr>
         <p:txBody>
-          <a:bodyPr/>
+          <a:bodyPr vert="horz" lIns="91440" tIns="45720" rIns="91440" bIns="45720" rtlCol="0" anchor="t">
+            <a:normAutofit/>
+          </a:bodyPr>
           <a:lstStyle/>
           <a:p>
             <a:pPr>
@@ -13780,25 +14476,6 @@
             <a:r>
               <a:rPr lang="en-IE" dirty="0"/>
               <a:t>Platforming will rely on the various obstacles to propel the player through the level.</a:t>
-            </a:r>
-          </a:p>
-          <a:p>
-            <a:pPr>
-              <a:lnSpc>
-                <a:spcPct val="150000"/>
-              </a:lnSpc>
-            </a:pPr>
-            <a:endParaRPr lang="en-IE" dirty="0"/>
-          </a:p>
-          <a:p>
-            <a:pPr>
-              <a:lnSpc>
-                <a:spcPct val="150000"/>
-              </a:lnSpc>
-            </a:pPr>
-            <a:r>
-              <a:rPr lang="en-IE" dirty="0"/>
-              <a:t>Final level will consist of a boss fight testing the skills the player has learned along the way.</a:t>
             </a:r>
           </a:p>
         </p:txBody>
@@ -13819,6 +14496,14 @@
 <file path=ppt/slides/slide4.xml><?xml version="1.0" encoding="utf-8"?>
 <p:sld xmlns:a="http://schemas.openxmlformats.org/drawingml/2006/main" xmlns:r="http://schemas.openxmlformats.org/officeDocument/2006/relationships" xmlns:p="http://schemas.openxmlformats.org/presentationml/2006/main">
   <p:cSld>
+    <p:bg>
+      <p:bgPr>
+        <a:solidFill>
+          <a:schemeClr val="bg1"/>
+        </a:solidFill>
+        <a:effectLst/>
+      </p:bgPr>
+    </p:bg>
     <p:spTree>
       <p:nvGrpSpPr>
         <p:cNvPr id="1" name=""/>
@@ -13833,6 +14518,603 @@
           <a:chExt cx="0" cy="0"/>
         </a:xfrm>
       </p:grpSpPr>
+      <p:sp>
+        <p:nvSpPr>
+          <p:cNvPr id="10" name="Rectangle 9">
+            <a:extLst>
+              <a:ext uri="{FF2B5EF4-FFF2-40B4-BE49-F238E27FC236}">
+                <a16:creationId xmlns:a16="http://schemas.microsoft.com/office/drawing/2014/main" id="{FC485557-E744-401B-A251-3650FAEEAD8E}"/>
+              </a:ext>
+              <a:ext uri="{C183D7F6-B498-43B3-948B-1728B52AA6E4}">
+                <adec:decorative xmlns:adec="http://schemas.microsoft.com/office/drawing/2017/decorative" val="1"/>
+              </a:ext>
+            </a:extLst>
+          </p:cNvPr>
+          <p:cNvSpPr>
+            <a:spLocks noGrp="1" noRot="1" noChangeAspect="1" noMove="1" noResize="1" noEditPoints="1" noAdjustHandles="1" noChangeArrowheads="1" noChangeShapeType="1" noTextEdit="1"/>
+          </p:cNvSpPr>
+          <p:nvPr>
+            <p:extLst>
+              <p:ext uri="{386F3935-93C4-4BCD-93E2-E3B085C9AB24}">
+                <p16:designElem xmlns:p16="http://schemas.microsoft.com/office/powerpoint/2015/main" val="1"/>
+              </p:ext>
+            </p:extLst>
+          </p:nvPr>
+        </p:nvSpPr>
+        <p:spPr>
+          <a:xfrm>
+            <a:off x="0" y="0"/>
+            <a:ext cx="12192000" cy="6858000"/>
+          </a:xfrm>
+          <a:prstGeom prst="rect">
+            <a:avLst/>
+          </a:prstGeom>
+          <a:ln>
+            <a:noFill/>
+          </a:ln>
+        </p:spPr>
+        <p:style>
+          <a:lnRef idx="2">
+            <a:schemeClr val="accent1">
+              <a:shade val="50000"/>
+            </a:schemeClr>
+          </a:lnRef>
+          <a:fillRef idx="1003">
+            <a:schemeClr val="dk2"/>
+          </a:fillRef>
+          <a:effectRef idx="0">
+            <a:schemeClr val="accent1"/>
+          </a:effectRef>
+          <a:fontRef idx="minor">
+            <a:schemeClr val="lt1"/>
+          </a:fontRef>
+        </p:style>
+      </p:sp>
+      <p:sp>
+        <p:nvSpPr>
+          <p:cNvPr id="12" name="Freeform: Shape 11">
+            <a:extLst>
+              <a:ext uri="{FF2B5EF4-FFF2-40B4-BE49-F238E27FC236}">
+                <a16:creationId xmlns:a16="http://schemas.microsoft.com/office/drawing/2014/main" id="{986D68AF-6B45-4B98-8634-61D8C9C05662}"/>
+              </a:ext>
+              <a:ext uri="{C183D7F6-B498-43B3-948B-1728B52AA6E4}">
+                <adec:decorative xmlns:adec="http://schemas.microsoft.com/office/drawing/2017/decorative" val="1"/>
+              </a:ext>
+            </a:extLst>
+          </p:cNvPr>
+          <p:cNvSpPr>
+            <a:spLocks noGrp="1" noRot="1" noChangeAspect="1" noMove="1" noResize="1" noEditPoints="1" noAdjustHandles="1" noChangeArrowheads="1" noChangeShapeType="1" noTextEdit="1"/>
+          </p:cNvSpPr>
+          <p:nvPr>
+            <p:extLst>
+              <p:ext uri="{386F3935-93C4-4BCD-93E2-E3B085C9AB24}">
+                <p16:designElem xmlns:p16="http://schemas.microsoft.com/office/powerpoint/2015/main" val="1"/>
+              </p:ext>
+            </p:extLst>
+          </p:nvPr>
+        </p:nvSpPr>
+        <p:spPr bwMode="gray">
+          <a:xfrm rot="16200000">
+            <a:off x="5171964" y="-140866"/>
+            <a:ext cx="6053670" cy="7139732"/>
+          </a:xfrm>
+          <a:custGeom>
+            <a:avLst/>
+            <a:gdLst>
+              <a:gd name="connsiteX0" fmla="*/ 6053670 w 6053670"/>
+              <a:gd name="connsiteY0" fmla="*/ 1098 h 7139732"/>
+              <a:gd name="connsiteX1" fmla="*/ 6053670 w 6053670"/>
+              <a:gd name="connsiteY1" fmla="*/ 1084479 h 7139732"/>
+              <a:gd name="connsiteX2" fmla="*/ 6053670 w 6053670"/>
+              <a:gd name="connsiteY2" fmla="*/ 1254558 h 7139732"/>
+              <a:gd name="connsiteX3" fmla="*/ 6053670 w 6053670"/>
+              <a:gd name="connsiteY3" fmla="*/ 7139732 h 7139732"/>
+              <a:gd name="connsiteX4" fmla="*/ 0 w 6053670"/>
+              <a:gd name="connsiteY4" fmla="*/ 7139732 h 7139732"/>
+              <a:gd name="connsiteX5" fmla="*/ 0 w 6053670"/>
+              <a:gd name="connsiteY5" fmla="*/ 1249853 h 7139732"/>
+              <a:gd name="connsiteX6" fmla="*/ 0 w 6053670"/>
+              <a:gd name="connsiteY6" fmla="*/ 1084479 h 7139732"/>
+              <a:gd name="connsiteX7" fmla="*/ 0 w 6053670"/>
+              <a:gd name="connsiteY7" fmla="*/ 0 h 7139732"/>
+              <a:gd name="connsiteX8" fmla="*/ 35717 w 6053670"/>
+              <a:gd name="connsiteY8" fmla="*/ 5488 h 7139732"/>
+              <a:gd name="connsiteX9" fmla="*/ 140445 w 6053670"/>
+              <a:gd name="connsiteY9" fmla="*/ 21641 h 7139732"/>
+              <a:gd name="connsiteX10" fmla="*/ 216722 w 6053670"/>
+              <a:gd name="connsiteY10" fmla="*/ 32932 h 7139732"/>
+              <a:gd name="connsiteX11" fmla="*/ 307527 w 6053670"/>
+              <a:gd name="connsiteY11" fmla="*/ 44850 h 7139732"/>
+              <a:gd name="connsiteX12" fmla="*/ 415282 w 6053670"/>
+              <a:gd name="connsiteY12" fmla="*/ 59121 h 7139732"/>
+              <a:gd name="connsiteX13" fmla="*/ 534539 w 6053670"/>
+              <a:gd name="connsiteY13" fmla="*/ 74175 h 7139732"/>
+              <a:gd name="connsiteX14" fmla="*/ 668931 w 6053670"/>
+              <a:gd name="connsiteY14" fmla="*/ 90014 h 7139732"/>
+              <a:gd name="connsiteX15" fmla="*/ 815430 w 6053670"/>
+              <a:gd name="connsiteY15" fmla="*/ 106794 h 7139732"/>
+              <a:gd name="connsiteX16" fmla="*/ 974641 w 6053670"/>
+              <a:gd name="connsiteY16" fmla="*/ 123574 h 7139732"/>
+              <a:gd name="connsiteX17" fmla="*/ 1144144 w 6053670"/>
+              <a:gd name="connsiteY17" fmla="*/ 140667 h 7139732"/>
+              <a:gd name="connsiteX18" fmla="*/ 1326965 w 6053670"/>
+              <a:gd name="connsiteY18" fmla="*/ 156506 h 7139732"/>
+              <a:gd name="connsiteX19" fmla="*/ 1518261 w 6053670"/>
+              <a:gd name="connsiteY19" fmla="*/ 171717 h 7139732"/>
+              <a:gd name="connsiteX20" fmla="*/ 1720453 w 6053670"/>
+              <a:gd name="connsiteY20" fmla="*/ 185518 h 7139732"/>
+              <a:gd name="connsiteX21" fmla="*/ 1931121 w 6053670"/>
+              <a:gd name="connsiteY21" fmla="*/ 198690 h 7139732"/>
+              <a:gd name="connsiteX22" fmla="*/ 2150869 w 6053670"/>
+              <a:gd name="connsiteY22" fmla="*/ 211079 h 7139732"/>
+              <a:gd name="connsiteX23" fmla="*/ 2263467 w 6053670"/>
+              <a:gd name="connsiteY23" fmla="*/ 215470 h 7139732"/>
+              <a:gd name="connsiteX24" fmla="*/ 2378487 w 6053670"/>
+              <a:gd name="connsiteY24" fmla="*/ 220332 h 7139732"/>
+              <a:gd name="connsiteX25" fmla="*/ 2495323 w 6053670"/>
+              <a:gd name="connsiteY25" fmla="*/ 224879 h 7139732"/>
+              <a:gd name="connsiteX26" fmla="*/ 2612764 w 6053670"/>
+              <a:gd name="connsiteY26" fmla="*/ 227859 h 7139732"/>
+              <a:gd name="connsiteX27" fmla="*/ 2732627 w 6053670"/>
+              <a:gd name="connsiteY27" fmla="*/ 230525 h 7139732"/>
+              <a:gd name="connsiteX28" fmla="*/ 2853700 w 6053670"/>
+              <a:gd name="connsiteY28" fmla="*/ 233348 h 7139732"/>
+              <a:gd name="connsiteX29" fmla="*/ 2977195 w 6053670"/>
+              <a:gd name="connsiteY29" fmla="*/ 235229 h 7139732"/>
+              <a:gd name="connsiteX30" fmla="*/ 3101901 w 6053670"/>
+              <a:gd name="connsiteY30" fmla="*/ 235229 h 7139732"/>
+              <a:gd name="connsiteX31" fmla="*/ 3227817 w 6053670"/>
+              <a:gd name="connsiteY31" fmla="*/ 236170 h 7139732"/>
+              <a:gd name="connsiteX32" fmla="*/ 3354944 w 6053670"/>
+              <a:gd name="connsiteY32" fmla="*/ 235229 h 7139732"/>
+              <a:gd name="connsiteX33" fmla="*/ 3483887 w 6053670"/>
+              <a:gd name="connsiteY33" fmla="*/ 233348 h 7139732"/>
+              <a:gd name="connsiteX34" fmla="*/ 3612830 w 6053670"/>
+              <a:gd name="connsiteY34" fmla="*/ 231623 h 7139732"/>
+              <a:gd name="connsiteX35" fmla="*/ 3743590 w 6053670"/>
+              <a:gd name="connsiteY35" fmla="*/ 227859 h 7139732"/>
+              <a:gd name="connsiteX36" fmla="*/ 3875560 w 6053670"/>
+              <a:gd name="connsiteY36" fmla="*/ 223938 h 7139732"/>
+              <a:gd name="connsiteX37" fmla="*/ 4007530 w 6053670"/>
+              <a:gd name="connsiteY37" fmla="*/ 219391 h 7139732"/>
+              <a:gd name="connsiteX38" fmla="*/ 4140710 w 6053670"/>
+              <a:gd name="connsiteY38" fmla="*/ 212961 h 7139732"/>
+              <a:gd name="connsiteX39" fmla="*/ 4275102 w 6053670"/>
+              <a:gd name="connsiteY39" fmla="*/ 205277 h 7139732"/>
+              <a:gd name="connsiteX40" fmla="*/ 4410098 w 6053670"/>
+              <a:gd name="connsiteY40" fmla="*/ 197907 h 7139732"/>
+              <a:gd name="connsiteX41" fmla="*/ 4545096 w 6053670"/>
+              <a:gd name="connsiteY41" fmla="*/ 188498 h 7139732"/>
+              <a:gd name="connsiteX42" fmla="*/ 4681909 w 6053670"/>
+              <a:gd name="connsiteY42" fmla="*/ 177207 h 7139732"/>
+              <a:gd name="connsiteX43" fmla="*/ 4816905 w 6053670"/>
+              <a:gd name="connsiteY43" fmla="*/ 165916 h 7139732"/>
+              <a:gd name="connsiteX44" fmla="*/ 4954323 w 6053670"/>
+              <a:gd name="connsiteY44" fmla="*/ 152899 h 7139732"/>
+              <a:gd name="connsiteX45" fmla="*/ 5092347 w 6053670"/>
+              <a:gd name="connsiteY45" fmla="*/ 138629 h 7139732"/>
+              <a:gd name="connsiteX46" fmla="*/ 5228555 w 6053670"/>
+              <a:gd name="connsiteY46" fmla="*/ 123574 h 7139732"/>
+              <a:gd name="connsiteX47" fmla="*/ 5366578 w 6053670"/>
+              <a:gd name="connsiteY47" fmla="*/ 106010 h 7139732"/>
+              <a:gd name="connsiteX48" fmla="*/ 5503997 w 6053670"/>
+              <a:gd name="connsiteY48" fmla="*/ 87192 h 7139732"/>
+              <a:gd name="connsiteX49" fmla="*/ 5642020 w 6053670"/>
+              <a:gd name="connsiteY49" fmla="*/ 68530 h 7139732"/>
+              <a:gd name="connsiteX50" fmla="*/ 5779438 w 6053670"/>
+              <a:gd name="connsiteY50" fmla="*/ 46733 h 7139732"/>
+              <a:gd name="connsiteX51" fmla="*/ 5916251 w 6053670"/>
+              <a:gd name="connsiteY51" fmla="*/ 24464 h 7139732"/>
+            </a:gdLst>
+            <a:ahLst/>
+            <a:cxnLst>
+              <a:cxn ang="0">
+                <a:pos x="connsiteX0" y="connsiteY0"/>
+              </a:cxn>
+              <a:cxn ang="0">
+                <a:pos x="connsiteX1" y="connsiteY1"/>
+              </a:cxn>
+              <a:cxn ang="0">
+                <a:pos x="connsiteX2" y="connsiteY2"/>
+              </a:cxn>
+              <a:cxn ang="0">
+                <a:pos x="connsiteX3" y="connsiteY3"/>
+              </a:cxn>
+              <a:cxn ang="0">
+                <a:pos x="connsiteX4" y="connsiteY4"/>
+              </a:cxn>
+              <a:cxn ang="0">
+                <a:pos x="connsiteX5" y="connsiteY5"/>
+              </a:cxn>
+              <a:cxn ang="0">
+                <a:pos x="connsiteX6" y="connsiteY6"/>
+              </a:cxn>
+              <a:cxn ang="0">
+                <a:pos x="connsiteX7" y="connsiteY7"/>
+              </a:cxn>
+              <a:cxn ang="0">
+                <a:pos x="connsiteX8" y="connsiteY8"/>
+              </a:cxn>
+              <a:cxn ang="0">
+                <a:pos x="connsiteX9" y="connsiteY9"/>
+              </a:cxn>
+              <a:cxn ang="0">
+                <a:pos x="connsiteX10" y="connsiteY10"/>
+              </a:cxn>
+              <a:cxn ang="0">
+                <a:pos x="connsiteX11" y="connsiteY11"/>
+              </a:cxn>
+              <a:cxn ang="0">
+                <a:pos x="connsiteX12" y="connsiteY12"/>
+              </a:cxn>
+              <a:cxn ang="0">
+                <a:pos x="connsiteX13" y="connsiteY13"/>
+              </a:cxn>
+              <a:cxn ang="0">
+                <a:pos x="connsiteX14" y="connsiteY14"/>
+              </a:cxn>
+              <a:cxn ang="0">
+                <a:pos x="connsiteX15" y="connsiteY15"/>
+              </a:cxn>
+              <a:cxn ang="0">
+                <a:pos x="connsiteX16" y="connsiteY16"/>
+              </a:cxn>
+              <a:cxn ang="0">
+                <a:pos x="connsiteX17" y="connsiteY17"/>
+              </a:cxn>
+              <a:cxn ang="0">
+                <a:pos x="connsiteX18" y="connsiteY18"/>
+              </a:cxn>
+              <a:cxn ang="0">
+                <a:pos x="connsiteX19" y="connsiteY19"/>
+              </a:cxn>
+              <a:cxn ang="0">
+                <a:pos x="connsiteX20" y="connsiteY20"/>
+              </a:cxn>
+              <a:cxn ang="0">
+                <a:pos x="connsiteX21" y="connsiteY21"/>
+              </a:cxn>
+              <a:cxn ang="0">
+                <a:pos x="connsiteX22" y="connsiteY22"/>
+              </a:cxn>
+              <a:cxn ang="0">
+                <a:pos x="connsiteX23" y="connsiteY23"/>
+              </a:cxn>
+              <a:cxn ang="0">
+                <a:pos x="connsiteX24" y="connsiteY24"/>
+              </a:cxn>
+              <a:cxn ang="0">
+                <a:pos x="connsiteX25" y="connsiteY25"/>
+              </a:cxn>
+              <a:cxn ang="0">
+                <a:pos x="connsiteX26" y="connsiteY26"/>
+              </a:cxn>
+              <a:cxn ang="0">
+                <a:pos x="connsiteX27" y="connsiteY27"/>
+              </a:cxn>
+              <a:cxn ang="0">
+                <a:pos x="connsiteX28" y="connsiteY28"/>
+              </a:cxn>
+              <a:cxn ang="0">
+                <a:pos x="connsiteX29" y="connsiteY29"/>
+              </a:cxn>
+              <a:cxn ang="0">
+                <a:pos x="connsiteX30" y="connsiteY30"/>
+              </a:cxn>
+              <a:cxn ang="0">
+                <a:pos x="connsiteX31" y="connsiteY31"/>
+              </a:cxn>
+              <a:cxn ang="0">
+                <a:pos x="connsiteX32" y="connsiteY32"/>
+              </a:cxn>
+              <a:cxn ang="0">
+                <a:pos x="connsiteX33" y="connsiteY33"/>
+              </a:cxn>
+              <a:cxn ang="0">
+                <a:pos x="connsiteX34" y="connsiteY34"/>
+              </a:cxn>
+              <a:cxn ang="0">
+                <a:pos x="connsiteX35" y="connsiteY35"/>
+              </a:cxn>
+              <a:cxn ang="0">
+                <a:pos x="connsiteX36" y="connsiteY36"/>
+              </a:cxn>
+              <a:cxn ang="0">
+                <a:pos x="connsiteX37" y="connsiteY37"/>
+              </a:cxn>
+              <a:cxn ang="0">
+                <a:pos x="connsiteX38" y="connsiteY38"/>
+              </a:cxn>
+              <a:cxn ang="0">
+                <a:pos x="connsiteX39" y="connsiteY39"/>
+              </a:cxn>
+              <a:cxn ang="0">
+                <a:pos x="connsiteX40" y="connsiteY40"/>
+              </a:cxn>
+              <a:cxn ang="0">
+                <a:pos x="connsiteX41" y="connsiteY41"/>
+              </a:cxn>
+              <a:cxn ang="0">
+                <a:pos x="connsiteX42" y="connsiteY42"/>
+              </a:cxn>
+              <a:cxn ang="0">
+                <a:pos x="connsiteX43" y="connsiteY43"/>
+              </a:cxn>
+              <a:cxn ang="0">
+                <a:pos x="connsiteX44" y="connsiteY44"/>
+              </a:cxn>
+              <a:cxn ang="0">
+                <a:pos x="connsiteX45" y="connsiteY45"/>
+              </a:cxn>
+              <a:cxn ang="0">
+                <a:pos x="connsiteX46" y="connsiteY46"/>
+              </a:cxn>
+              <a:cxn ang="0">
+                <a:pos x="connsiteX47" y="connsiteY47"/>
+              </a:cxn>
+              <a:cxn ang="0">
+                <a:pos x="connsiteX48" y="connsiteY48"/>
+              </a:cxn>
+              <a:cxn ang="0">
+                <a:pos x="connsiteX49" y="connsiteY49"/>
+              </a:cxn>
+              <a:cxn ang="0">
+                <a:pos x="connsiteX50" y="connsiteY50"/>
+              </a:cxn>
+              <a:cxn ang="0">
+                <a:pos x="connsiteX51" y="connsiteY51"/>
+              </a:cxn>
+            </a:cxnLst>
+            <a:rect l="l" t="t" r="r" b="b"/>
+            <a:pathLst>
+              <a:path w="6053670" h="7139732">
+                <a:moveTo>
+                  <a:pt x="6053670" y="1098"/>
+                </a:moveTo>
+                <a:lnTo>
+                  <a:pt x="6053670" y="1084479"/>
+                </a:lnTo>
+                <a:lnTo>
+                  <a:pt x="6053670" y="1254558"/>
+                </a:lnTo>
+                <a:lnTo>
+                  <a:pt x="6053670" y="7139732"/>
+                </a:lnTo>
+                <a:lnTo>
+                  <a:pt x="0" y="7139732"/>
+                </a:lnTo>
+                <a:lnTo>
+                  <a:pt x="0" y="1249853"/>
+                </a:lnTo>
+                <a:lnTo>
+                  <a:pt x="0" y="1084479"/>
+                </a:lnTo>
+                <a:lnTo>
+                  <a:pt x="0" y="0"/>
+                </a:lnTo>
+                <a:lnTo>
+                  <a:pt x="35717" y="5488"/>
+                </a:lnTo>
+                <a:lnTo>
+                  <a:pt x="140445" y="21641"/>
+                </a:lnTo>
+                <a:lnTo>
+                  <a:pt x="216722" y="32932"/>
+                </a:lnTo>
+                <a:lnTo>
+                  <a:pt x="307527" y="44850"/>
+                </a:lnTo>
+                <a:lnTo>
+                  <a:pt x="415282" y="59121"/>
+                </a:lnTo>
+                <a:lnTo>
+                  <a:pt x="534539" y="74175"/>
+                </a:lnTo>
+                <a:lnTo>
+                  <a:pt x="668931" y="90014"/>
+                </a:lnTo>
+                <a:lnTo>
+                  <a:pt x="815430" y="106794"/>
+                </a:lnTo>
+                <a:lnTo>
+                  <a:pt x="974641" y="123574"/>
+                </a:lnTo>
+                <a:lnTo>
+                  <a:pt x="1144144" y="140667"/>
+                </a:lnTo>
+                <a:lnTo>
+                  <a:pt x="1326965" y="156506"/>
+                </a:lnTo>
+                <a:lnTo>
+                  <a:pt x="1518261" y="171717"/>
+                </a:lnTo>
+                <a:lnTo>
+                  <a:pt x="1720453" y="185518"/>
+                </a:lnTo>
+                <a:lnTo>
+                  <a:pt x="1931121" y="198690"/>
+                </a:lnTo>
+                <a:lnTo>
+                  <a:pt x="2150869" y="211079"/>
+                </a:lnTo>
+                <a:lnTo>
+                  <a:pt x="2263467" y="215470"/>
+                </a:lnTo>
+                <a:lnTo>
+                  <a:pt x="2378487" y="220332"/>
+                </a:lnTo>
+                <a:lnTo>
+                  <a:pt x="2495323" y="224879"/>
+                </a:lnTo>
+                <a:lnTo>
+                  <a:pt x="2612764" y="227859"/>
+                </a:lnTo>
+                <a:lnTo>
+                  <a:pt x="2732627" y="230525"/>
+                </a:lnTo>
+                <a:lnTo>
+                  <a:pt x="2853700" y="233348"/>
+                </a:lnTo>
+                <a:lnTo>
+                  <a:pt x="2977195" y="235229"/>
+                </a:lnTo>
+                <a:lnTo>
+                  <a:pt x="3101901" y="235229"/>
+                </a:lnTo>
+                <a:lnTo>
+                  <a:pt x="3227817" y="236170"/>
+                </a:lnTo>
+                <a:lnTo>
+                  <a:pt x="3354944" y="235229"/>
+                </a:lnTo>
+                <a:lnTo>
+                  <a:pt x="3483887" y="233348"/>
+                </a:lnTo>
+                <a:lnTo>
+                  <a:pt x="3612830" y="231623"/>
+                </a:lnTo>
+                <a:lnTo>
+                  <a:pt x="3743590" y="227859"/>
+                </a:lnTo>
+                <a:lnTo>
+                  <a:pt x="3875560" y="223938"/>
+                </a:lnTo>
+                <a:lnTo>
+                  <a:pt x="4007530" y="219391"/>
+                </a:lnTo>
+                <a:lnTo>
+                  <a:pt x="4140710" y="212961"/>
+                </a:lnTo>
+                <a:lnTo>
+                  <a:pt x="4275102" y="205277"/>
+                </a:lnTo>
+                <a:lnTo>
+                  <a:pt x="4410098" y="197907"/>
+                </a:lnTo>
+                <a:lnTo>
+                  <a:pt x="4545096" y="188498"/>
+                </a:lnTo>
+                <a:lnTo>
+                  <a:pt x="4681909" y="177207"/>
+                </a:lnTo>
+                <a:lnTo>
+                  <a:pt x="4816905" y="165916"/>
+                </a:lnTo>
+                <a:lnTo>
+                  <a:pt x="4954323" y="152899"/>
+                </a:lnTo>
+                <a:lnTo>
+                  <a:pt x="5092347" y="138629"/>
+                </a:lnTo>
+                <a:lnTo>
+                  <a:pt x="5228555" y="123574"/>
+                </a:lnTo>
+                <a:lnTo>
+                  <a:pt x="5366578" y="106010"/>
+                </a:lnTo>
+                <a:lnTo>
+                  <a:pt x="5503997" y="87192"/>
+                </a:lnTo>
+                <a:lnTo>
+                  <a:pt x="5642020" y="68530"/>
+                </a:lnTo>
+                <a:lnTo>
+                  <a:pt x="5779438" y="46733"/>
+                </a:lnTo>
+                <a:lnTo>
+                  <a:pt x="5916251" y="24464"/>
+                </a:lnTo>
+                <a:close/>
+              </a:path>
+            </a:pathLst>
+          </a:custGeom>
+          <a:solidFill>
+            <a:schemeClr val="tx1"/>
+          </a:solidFill>
+          <a:ln>
+            <a:noFill/>
+          </a:ln>
+        </p:spPr>
+      </p:sp>
+      <p:sp>
+        <p:nvSpPr>
+          <p:cNvPr id="14" name="Freeform 5">
+            <a:extLst>
+              <a:ext uri="{FF2B5EF4-FFF2-40B4-BE49-F238E27FC236}">
+                <a16:creationId xmlns:a16="http://schemas.microsoft.com/office/drawing/2014/main" id="{0143DE54-7BFF-4B29-8566-DF80EE4CCB07}"/>
+              </a:ext>
+              <a:ext uri="{C183D7F6-B498-43B3-948B-1728B52AA6E4}">
+                <adec:decorative xmlns:adec="http://schemas.microsoft.com/office/drawing/2017/decorative" val="1"/>
+              </a:ext>
+            </a:extLst>
+          </p:cNvPr>
+          <p:cNvSpPr>
+            <a:spLocks noGrp="1" noRot="1" noChangeAspect="1" noMove="1" noResize="1" noEditPoints="1" noAdjustHandles="1" noChangeArrowheads="1" noChangeShapeType="1" noTextEdit="1"/>
+          </p:cNvSpPr>
+          <p:nvPr>
+            <p:extLst>
+              <p:ext uri="{386F3935-93C4-4BCD-93E2-E3B085C9AB24}">
+                <p16:designElem xmlns:p16="http://schemas.microsoft.com/office/powerpoint/2015/main" val="1"/>
+              </p:ext>
+            </p:extLst>
+          </p:nvPr>
+        </p:nvSpPr>
+        <p:spPr bwMode="gray">
+          <a:xfrm>
+            <a:off x="0" y="1587"/>
+            <a:ext cx="12192000" cy="6856413"/>
+          </a:xfrm>
+          <a:custGeom>
+            <a:avLst/>
+            <a:gdLst/>
+            <a:ahLst/>
+            <a:cxnLst/>
+            <a:rect l="0" t="0" r="r" b="b"/>
+            <a:pathLst>
+              <a:path w="15356" h="8638">
+                <a:moveTo>
+                  <a:pt x="0" y="0"/>
+                </a:moveTo>
+                <a:lnTo>
+                  <a:pt x="0" y="8638"/>
+                </a:lnTo>
+                <a:lnTo>
+                  <a:pt x="15356" y="8638"/>
+                </a:lnTo>
+                <a:lnTo>
+                  <a:pt x="15356" y="0"/>
+                </a:lnTo>
+                <a:lnTo>
+                  <a:pt x="0" y="0"/>
+                </a:lnTo>
+                <a:close/>
+                <a:moveTo>
+                  <a:pt x="14748" y="8038"/>
+                </a:moveTo>
+                <a:lnTo>
+                  <a:pt x="600" y="8038"/>
+                </a:lnTo>
+                <a:lnTo>
+                  <a:pt x="600" y="592"/>
+                </a:lnTo>
+                <a:lnTo>
+                  <a:pt x="14748" y="592"/>
+                </a:lnTo>
+                <a:lnTo>
+                  <a:pt x="14748" y="8038"/>
+                </a:lnTo>
+                <a:close/>
+              </a:path>
+            </a:pathLst>
+          </a:custGeom>
+          <a:solidFill>
+            <a:schemeClr val="tx1"/>
+          </a:solidFill>
+          <a:ln>
+            <a:noFill/>
+          </a:ln>
+        </p:spPr>
+      </p:sp>
       <p:sp>
         <p:nvSpPr>
           <p:cNvPr id="2" name="Title 1">
@@ -13851,21 +15133,308 @@
         </p:nvSpPr>
         <p:spPr>
           <a:xfrm>
-            <a:off x="1154954" y="973668"/>
-            <a:ext cx="8761413" cy="706964"/>
+            <a:off x="1154955" y="973668"/>
+            <a:ext cx="2942210" cy="1020232"/>
           </a:xfrm>
         </p:spPr>
         <p:txBody>
-          <a:bodyPr/>
+          <a:bodyPr>
+            <a:normAutofit/>
+          </a:bodyPr>
           <a:lstStyle/>
           <a:p>
+            <a:pPr>
+              <a:lnSpc>
+                <a:spcPct val="90000"/>
+              </a:lnSpc>
+            </a:pPr>
             <a:r>
-              <a:rPr lang="en-IE"/>
+              <a:rPr lang="en-IE" sz="2500">
+                <a:solidFill>
+                  <a:srgbClr val="FFFFFE"/>
+                </a:solidFill>
+              </a:rPr>
               <a:t>Character design and controls</a:t>
             </a:r>
-            <a:endParaRPr lang="en-IE" dirty="0"/>
           </a:p>
         </p:txBody>
+      </p:sp>
+      <p:sp>
+        <p:nvSpPr>
+          <p:cNvPr id="16" name="Freeform 5">
+            <a:extLst>
+              <a:ext uri="{FF2B5EF4-FFF2-40B4-BE49-F238E27FC236}">
+                <a16:creationId xmlns:a16="http://schemas.microsoft.com/office/drawing/2014/main" id="{7C661810-D461-4214-A635-30A7D1714054}"/>
+              </a:ext>
+              <a:ext uri="{C183D7F6-B498-43B3-948B-1728B52AA6E4}">
+                <adec:decorative xmlns:adec="http://schemas.microsoft.com/office/drawing/2017/decorative" val="1"/>
+              </a:ext>
+            </a:extLst>
+          </p:cNvPr>
+          <p:cNvSpPr>
+            <a:spLocks noGrp="1" noRot="1" noChangeAspect="1" noMove="1" noResize="1" noEditPoints="1" noAdjustHandles="1" noChangeArrowheads="1" noChangeShapeType="1" noTextEdit="1"/>
+          </p:cNvSpPr>
+          <p:nvPr>
+            <p:extLst>
+              <p:ext uri="{386F3935-93C4-4BCD-93E2-E3B085C9AB24}">
+                <p16:designElem xmlns:p16="http://schemas.microsoft.com/office/powerpoint/2015/main" val="1"/>
+              </p:ext>
+            </p:extLst>
+          </p:nvPr>
+        </p:nvSpPr>
+        <p:spPr bwMode="gray">
+          <a:xfrm rot="15922489">
+            <a:off x="3140485" y="1826078"/>
+            <a:ext cx="3299407" cy="440924"/>
+          </a:xfrm>
+          <a:custGeom>
+            <a:avLst/>
+            <a:gdLst/>
+            <a:ahLst/>
+            <a:cxnLst/>
+            <a:rect l="l" t="t" r="r" b="b"/>
+            <a:pathLst>
+              <a:path w="10000" h="5291">
+                <a:moveTo>
+                  <a:pt x="85" y="2532"/>
+                </a:moveTo>
+                <a:cubicBezTo>
+                  <a:pt x="1736" y="3911"/>
+                  <a:pt x="7524" y="5298"/>
+                  <a:pt x="9958" y="5291"/>
+                </a:cubicBezTo>
+                <a:cubicBezTo>
+                  <a:pt x="9989" y="1958"/>
+                  <a:pt x="9969" y="3333"/>
+                  <a:pt x="10000" y="0"/>
+                </a:cubicBezTo>
+                <a:lnTo>
+                  <a:pt x="10000" y="0"/>
+                </a:lnTo>
+                <a:lnTo>
+                  <a:pt x="9667" y="204"/>
+                </a:lnTo>
+                <a:lnTo>
+                  <a:pt x="9334" y="400"/>
+                </a:lnTo>
+                <a:lnTo>
+                  <a:pt x="9001" y="590"/>
+                </a:lnTo>
+                <a:lnTo>
+                  <a:pt x="8667" y="753"/>
+                </a:lnTo>
+                <a:lnTo>
+                  <a:pt x="8333" y="917"/>
+                </a:lnTo>
+                <a:lnTo>
+                  <a:pt x="7999" y="1071"/>
+                </a:lnTo>
+                <a:lnTo>
+                  <a:pt x="7669" y="1202"/>
+                </a:lnTo>
+                <a:lnTo>
+                  <a:pt x="7333" y="1325"/>
+                </a:lnTo>
+                <a:lnTo>
+                  <a:pt x="7000" y="1440"/>
+                </a:lnTo>
+                <a:lnTo>
+                  <a:pt x="6673" y="1538"/>
+                </a:lnTo>
+                <a:lnTo>
+                  <a:pt x="6340" y="1636"/>
+                </a:lnTo>
+                <a:lnTo>
+                  <a:pt x="6013" y="1719"/>
+                </a:lnTo>
+                <a:lnTo>
+                  <a:pt x="5686" y="1784"/>
+                </a:lnTo>
+                <a:lnTo>
+                  <a:pt x="5359" y="1850"/>
+                </a:lnTo>
+                <a:lnTo>
+                  <a:pt x="5036" y="1906"/>
+                </a:lnTo>
+                <a:lnTo>
+                  <a:pt x="4717" y="1948"/>
+                </a:lnTo>
+                <a:lnTo>
+                  <a:pt x="4396" y="1980"/>
+                </a:lnTo>
+                <a:lnTo>
+                  <a:pt x="4079" y="2013"/>
+                </a:lnTo>
+                <a:lnTo>
+                  <a:pt x="3766" y="2029"/>
+                </a:lnTo>
+                <a:lnTo>
+                  <a:pt x="3454" y="2046"/>
+                </a:lnTo>
+                <a:lnTo>
+                  <a:pt x="3145" y="2053"/>
+                </a:lnTo>
+                <a:lnTo>
+                  <a:pt x="2839" y="2046"/>
+                </a:lnTo>
+                <a:lnTo>
+                  <a:pt x="2537" y="2046"/>
+                </a:lnTo>
+                <a:lnTo>
+                  <a:pt x="2238" y="2029"/>
+                </a:lnTo>
+                <a:lnTo>
+                  <a:pt x="1943" y="2004"/>
+                </a:lnTo>
+                <a:lnTo>
+                  <a:pt x="1653" y="1980"/>
+                </a:lnTo>
+                <a:lnTo>
+                  <a:pt x="1368" y="1955"/>
+                </a:lnTo>
+                <a:lnTo>
+                  <a:pt x="1085" y="1915"/>
+                </a:lnTo>
+                <a:lnTo>
+                  <a:pt x="806" y="1873"/>
+                </a:lnTo>
+                <a:lnTo>
+                  <a:pt x="533" y="1833"/>
+                </a:lnTo>
+                <a:lnTo>
+                  <a:pt x="0" y="1726"/>
+                </a:lnTo>
+                <a:cubicBezTo>
+                  <a:pt x="28" y="1995"/>
+                  <a:pt x="57" y="2263"/>
+                  <a:pt x="85" y="2532"/>
+                </a:cubicBezTo>
+                <a:close/>
+              </a:path>
+            </a:pathLst>
+          </a:custGeom>
+          <a:solidFill>
+            <a:schemeClr val="tx1">
+              <a:alpha val="20000"/>
+            </a:schemeClr>
+          </a:solidFill>
+          <a:ln>
+            <a:noFill/>
+          </a:ln>
+        </p:spPr>
+      </p:sp>
+      <p:pic>
+        <p:nvPicPr>
+          <p:cNvPr id="4" name="Picture 5" descr="A screenshot of a video game&#10;&#10;Description generated with high confidence">
+            <a:extLst>
+              <a:ext uri="{FF2B5EF4-FFF2-40B4-BE49-F238E27FC236}">
+                <a16:creationId xmlns:a16="http://schemas.microsoft.com/office/drawing/2014/main" id="{A3DE7060-4C12-42BE-80B4-056C4A64FC40}"/>
+              </a:ext>
+            </a:extLst>
+          </p:cNvPr>
+          <p:cNvPicPr>
+            <a:picLocks noChangeAspect="1"/>
+          </p:cNvPicPr>
+          <p:nvPr/>
+        </p:nvPicPr>
+        <p:blipFill>
+          <a:blip r:embed="rId2"/>
+          <a:stretch>
+            <a:fillRect/>
+          </a:stretch>
+        </p:blipFill>
+        <p:spPr>
+          <a:xfrm>
+            <a:off x="5274856" y="803751"/>
+            <a:ext cx="2953404" cy="5250498"/>
+          </a:xfrm>
+          <a:prstGeom prst="rect">
+            <a:avLst/>
+          </a:prstGeom>
+        </p:spPr>
+      </p:pic>
+      <p:pic>
+        <p:nvPicPr>
+          <p:cNvPr id="5" name="Picture 4">
+            <a:extLst>
+              <a:ext uri="{FF2B5EF4-FFF2-40B4-BE49-F238E27FC236}">
+                <a16:creationId xmlns:a16="http://schemas.microsoft.com/office/drawing/2014/main" id="{57B78E8E-705E-472F-B06E-4192588CFDF3}"/>
+              </a:ext>
+            </a:extLst>
+          </p:cNvPr>
+          <p:cNvPicPr>
+            <a:picLocks noChangeAspect="1"/>
+          </p:cNvPicPr>
+          <p:nvPr/>
+        </p:nvPicPr>
+        <p:blipFill>
+          <a:blip r:embed="rId3"/>
+          <a:stretch>
+            <a:fillRect/>
+          </a:stretch>
+        </p:blipFill>
+        <p:spPr>
+          <a:xfrm>
+            <a:off x="8472236" y="1875901"/>
+            <a:ext cx="3113904" cy="3106196"/>
+          </a:xfrm>
+          <a:prstGeom prst="rect">
+            <a:avLst/>
+          </a:prstGeom>
+        </p:spPr>
+      </p:pic>
+      <p:sp>
+        <p:nvSpPr>
+          <p:cNvPr id="18" name="Rectangle 17">
+            <a:extLst>
+              <a:ext uri="{FF2B5EF4-FFF2-40B4-BE49-F238E27FC236}">
+                <a16:creationId xmlns:a16="http://schemas.microsoft.com/office/drawing/2014/main" id="{ED6475A3-FF98-4FA0-B527-600EBA9BD68F}"/>
+              </a:ext>
+              <a:ext uri="{C183D7F6-B498-43B3-948B-1728B52AA6E4}">
+                <adec:decorative xmlns:adec="http://schemas.microsoft.com/office/drawing/2017/decorative" val="1"/>
+              </a:ext>
+            </a:extLst>
+          </p:cNvPr>
+          <p:cNvSpPr>
+            <a:spLocks noGrp="1" noRot="1" noChangeAspect="1" noMove="1" noResize="1" noEditPoints="1" noAdjustHandles="1" noChangeArrowheads="1" noChangeShapeType="1" noTextEdit="1"/>
+          </p:cNvSpPr>
+          <p:nvPr>
+            <p:extLst>
+              <p:ext uri="{386F3935-93C4-4BCD-93E2-E3B085C9AB24}">
+                <p16:designElem xmlns:p16="http://schemas.microsoft.com/office/powerpoint/2015/main" val="1"/>
+              </p:ext>
+            </p:extLst>
+          </p:nvPr>
+        </p:nvSpPr>
+        <p:spPr>
+          <a:xfrm>
+            <a:off x="10437812" y="0"/>
+            <a:ext cx="685800" cy="1143000"/>
+          </a:xfrm>
+          <a:prstGeom prst="rect">
+            <a:avLst/>
+          </a:prstGeom>
+          <a:solidFill>
+            <a:schemeClr val="accent1"/>
+          </a:solidFill>
+          <a:ln>
+            <a:noFill/>
+          </a:ln>
+        </p:spPr>
+        <p:style>
+          <a:lnRef idx="1">
+            <a:schemeClr val="accent1"/>
+          </a:lnRef>
+          <a:fillRef idx="3">
+            <a:schemeClr val="accent1"/>
+          </a:fillRef>
+          <a:effectRef idx="2">
+            <a:schemeClr val="accent1"/>
+          </a:effectRef>
+          <a:fontRef idx="minor">
+            <a:schemeClr val="lt1"/>
+          </a:fontRef>
+        </p:style>
       </p:sp>
       <p:sp>
         <p:nvSpPr>
@@ -13885,78 +15454,47 @@
         </p:nvSpPr>
         <p:spPr>
           <a:xfrm>
-            <a:off x="1154954" y="2603500"/>
-            <a:ext cx="8825659" cy="3416300"/>
+            <a:off x="1154955" y="2120900"/>
+            <a:ext cx="3133726" cy="3898900"/>
           </a:xfrm>
         </p:spPr>
         <p:txBody>
-          <a:bodyPr/>
+          <a:bodyPr>
+            <a:normAutofit/>
+          </a:bodyPr>
           <a:lstStyle/>
           <a:p>
-            <a:pPr>
-              <a:lnSpc>
-                <a:spcPct val="300000"/>
-              </a:lnSpc>
-            </a:pPr>
             <a:r>
-              <a:rPr lang="en-IE" dirty="0"/>
+              <a:rPr lang="en-IE">
+                <a:solidFill>
+                  <a:srgbClr val="FFFFFE"/>
+                </a:solidFill>
+              </a:rPr>
               <a:t>Vertical phone screen.</a:t>
             </a:r>
           </a:p>
           <a:p>
-            <a:pPr>
-              <a:lnSpc>
-                <a:spcPct val="300000"/>
-              </a:lnSpc>
-            </a:pPr>
             <a:r>
-              <a:rPr lang="en-IE" dirty="0"/>
+              <a:rPr lang="en-IE">
+                <a:solidFill>
+                  <a:srgbClr val="FFFFFE"/>
+                </a:solidFill>
+              </a:rPr>
               <a:t>3 buttons: left, right and jump.</a:t>
             </a:r>
           </a:p>
           <a:p>
-            <a:pPr>
-              <a:lnSpc>
-                <a:spcPct val="300000"/>
-              </a:lnSpc>
-            </a:pPr>
             <a:r>
-              <a:rPr lang="en-IE" dirty="0"/>
+              <a:rPr lang="en-IE">
+                <a:solidFill>
+                  <a:srgbClr val="FFFFFE"/>
+                </a:solidFill>
+              </a:rPr>
               <a:t>Easy mid air control.</a:t>
             </a:r>
           </a:p>
         </p:txBody>
       </p:sp>
-      <p:pic>
-        <p:nvPicPr>
-          <p:cNvPr id="5" name="Picture 4">
-            <a:extLst>
-              <a:ext uri="{FF2B5EF4-FFF2-40B4-BE49-F238E27FC236}">
-                <a16:creationId xmlns:a16="http://schemas.microsoft.com/office/drawing/2014/main" id="{57B78E8E-705E-472F-B06E-4192588CFDF3}"/>
-              </a:ext>
-            </a:extLst>
-          </p:cNvPr>
-          <p:cNvPicPr>
-            <a:picLocks noChangeAspect="1"/>
-          </p:cNvPicPr>
-          <p:nvPr/>
-        </p:nvPicPr>
-        <p:blipFill>
-          <a:blip r:embed="rId2"/>
-          <a:stretch>
-            <a:fillRect/>
-          </a:stretch>
-        </p:blipFill>
-        <p:spPr>
-          <a:xfrm>
-            <a:off x="7529804" y="2562369"/>
-            <a:ext cx="3507242" cy="3498561"/>
-          </a:xfrm>
-          <a:prstGeom prst="rect">
-            <a:avLst/>
-          </a:prstGeom>
-        </p:spPr>
-      </p:pic>
     </p:spTree>
     <p:extLst>
       <p:ext uri="{BB962C8B-B14F-4D97-AF65-F5344CB8AC3E}">
@@ -13965,7 +15503,7 @@
     </p:extLst>
   </p:cSld>
   <p:clrMapOvr>
-    <a:masterClrMapping/>
+    <a:overrideClrMapping bg1="dk1" tx1="lt1" bg2="dk2" tx2="lt2" accent1="accent1" accent2="accent2" accent3="accent3" accent4="accent4" accent5="accent5" accent6="accent6" hlink="hlink" folHlink="folHlink"/>
   </p:clrMapOvr>
 </p:sld>
 </file>
@@ -16177,4 +17715,299 @@
     </a:ext>
   </a:extLst>
 </a:theme>
+</file>
+
+<file path=ppt/theme/theme2.xml><?xml version="1.0" encoding="utf-8"?>
+<a:theme xmlns:a="http://schemas.openxmlformats.org/drawingml/2006/main" name="Office Theme">
+  <a:themeElements>
+    <a:clrScheme name="Office">
+      <a:dk1>
+        <a:sysClr val="windowText" lastClr="000000"/>
+      </a:dk1>
+      <a:lt1>
+        <a:sysClr val="window" lastClr="FFFFFF"/>
+      </a:lt1>
+      <a:dk2>
+        <a:srgbClr val="44546A"/>
+      </a:dk2>
+      <a:lt2>
+        <a:srgbClr val="E7E6E6"/>
+      </a:lt2>
+      <a:accent1>
+        <a:srgbClr val="4472C4"/>
+      </a:accent1>
+      <a:accent2>
+        <a:srgbClr val="ED7D31"/>
+      </a:accent2>
+      <a:accent3>
+        <a:srgbClr val="A5A5A5"/>
+      </a:accent3>
+      <a:accent4>
+        <a:srgbClr val="FFC000"/>
+      </a:accent4>
+      <a:accent5>
+        <a:srgbClr val="5B9BD5"/>
+      </a:accent5>
+      <a:accent6>
+        <a:srgbClr val="70AD47"/>
+      </a:accent6>
+      <a:hlink>
+        <a:srgbClr val="0563C1"/>
+      </a:hlink>
+      <a:folHlink>
+        <a:srgbClr val="954F72"/>
+      </a:folHlink>
+    </a:clrScheme>
+    <a:fontScheme name="Office">
+      <a:majorFont>
+        <a:latin typeface="Calibri Light" panose="020F0302020204030204"/>
+        <a:ea typeface=""/>
+        <a:cs typeface=""/>
+        <a:font script="Jpan" typeface="游ゴシック Light"/>
+        <a:font script="Hang" typeface="맑은 고딕"/>
+        <a:font script="Hans" typeface="等线 Light"/>
+        <a:font script="Hant" typeface="新細明體"/>
+        <a:font script="Arab" typeface="Times New Roman"/>
+        <a:font script="Hebr" typeface="Times New Roman"/>
+        <a:font script="Thai" typeface="Angsana New"/>
+        <a:font script="Ethi" typeface="Nyala"/>
+        <a:font script="Beng" typeface="Vrinda"/>
+        <a:font script="Gujr" typeface="Shruti"/>
+        <a:font script="Khmr" typeface="MoolBoran"/>
+        <a:font script="Knda" typeface="Tunga"/>
+        <a:font script="Guru" typeface="Raavi"/>
+        <a:font script="Cans" typeface="Euphemia"/>
+        <a:font script="Cher" typeface="Plantagenet Cherokee"/>
+        <a:font script="Yiii" typeface="Microsoft Yi Baiti"/>
+        <a:font script="Tibt" typeface="Microsoft Himalaya"/>
+        <a:font script="Thaa" typeface="MV Boli"/>
+        <a:font script="Deva" typeface="Mangal"/>
+        <a:font script="Telu" typeface="Gautami"/>
+        <a:font script="Taml" typeface="Latha"/>
+        <a:font script="Syrc" typeface="Estrangelo Edessa"/>
+        <a:font script="Orya" typeface="Kalinga"/>
+        <a:font script="Mlym" typeface="Kartika"/>
+        <a:font script="Laoo" typeface="DokChampa"/>
+        <a:font script="Sinh" typeface="Iskoola Pota"/>
+        <a:font script="Mong" typeface="Mongolian Baiti"/>
+        <a:font script="Viet" typeface="Times New Roman"/>
+        <a:font script="Uigh" typeface="Microsoft Uighur"/>
+        <a:font script="Geor" typeface="Sylfaen"/>
+        <a:font script="Armn" typeface="Arial"/>
+        <a:font script="Bugi" typeface="Leelawadee UI"/>
+        <a:font script="Bopo" typeface="Microsoft JhengHei"/>
+        <a:font script="Java" typeface="Javanese Text"/>
+        <a:font script="Lisu" typeface="Segoe UI"/>
+        <a:font script="Mymr" typeface="Myanmar Text"/>
+        <a:font script="Nkoo" typeface="Ebrima"/>
+        <a:font script="Olck" typeface="Nirmala UI"/>
+        <a:font script="Osma" typeface="Ebrima"/>
+        <a:font script="Phag" typeface="Phagspa"/>
+        <a:font script="Syrn" typeface="Estrangelo Edessa"/>
+        <a:font script="Syrj" typeface="Estrangelo Edessa"/>
+        <a:font script="Syre" typeface="Estrangelo Edessa"/>
+        <a:font script="Sora" typeface="Nirmala UI"/>
+        <a:font script="Tale" typeface="Microsoft Tai Le"/>
+        <a:font script="Talu" typeface="Microsoft New Tai Lue"/>
+        <a:font script="Tfng" typeface="Ebrima"/>
+      </a:majorFont>
+      <a:minorFont>
+        <a:latin typeface="Calibri" panose="020F0502020204030204"/>
+        <a:ea typeface=""/>
+        <a:cs typeface=""/>
+        <a:font script="Jpan" typeface="游ゴシック"/>
+        <a:font script="Hang" typeface="맑은 고딕"/>
+        <a:font script="Hans" typeface="等线"/>
+        <a:font script="Hant" typeface="新細明體"/>
+        <a:font script="Arab" typeface="Arial"/>
+        <a:font script="Hebr" typeface="Arial"/>
+        <a:font script="Thai" typeface="Cordia New"/>
+        <a:font script="Ethi" typeface="Nyala"/>
+        <a:font script="Beng" typeface="Vrinda"/>
+        <a:font script="Gujr" typeface="Shruti"/>
+        <a:font script="Khmr" typeface="DaunPenh"/>
+        <a:font script="Knda" typeface="Tunga"/>
+        <a:font script="Guru" typeface="Raavi"/>
+        <a:font script="Cans" typeface="Euphemia"/>
+        <a:font script="Cher" typeface="Plantagenet Cherokee"/>
+        <a:font script="Yiii" typeface="Microsoft Yi Baiti"/>
+        <a:font script="Tibt" typeface="Microsoft Himalaya"/>
+        <a:font script="Thaa" typeface="MV Boli"/>
+        <a:font script="Deva" typeface="Mangal"/>
+        <a:font script="Telu" typeface="Gautami"/>
+        <a:font script="Taml" typeface="Latha"/>
+        <a:font script="Syrc" typeface="Estrangelo Edessa"/>
+        <a:font script="Orya" typeface="Kalinga"/>
+        <a:font script="Mlym" typeface="Kartika"/>
+        <a:font script="Laoo" typeface="DokChampa"/>
+        <a:font script="Sinh" typeface="Iskoola Pota"/>
+        <a:font script="Mong" typeface="Mongolian Baiti"/>
+        <a:font script="Viet" typeface="Arial"/>
+        <a:font script="Uigh" typeface="Microsoft Uighur"/>
+        <a:font script="Geor" typeface="Sylfaen"/>
+        <a:font script="Armn" typeface="Arial"/>
+        <a:font script="Bugi" typeface="Leelawadee UI"/>
+        <a:font script="Bopo" typeface="Microsoft JhengHei"/>
+        <a:font script="Java" typeface="Javanese Text"/>
+        <a:font script="Lisu" typeface="Segoe UI"/>
+        <a:font script="Mymr" typeface="Myanmar Text"/>
+        <a:font script="Nkoo" typeface="Ebrima"/>
+        <a:font script="Olck" typeface="Nirmala UI"/>
+        <a:font script="Osma" typeface="Ebrima"/>
+        <a:font script="Phag" typeface="Phagspa"/>
+        <a:font script="Syrn" typeface="Estrangelo Edessa"/>
+        <a:font script="Syrj" typeface="Estrangelo Edessa"/>
+        <a:font script="Syre" typeface="Estrangelo Edessa"/>
+        <a:font script="Sora" typeface="Nirmala UI"/>
+        <a:font script="Tale" typeface="Microsoft Tai Le"/>
+        <a:font script="Talu" typeface="Microsoft New Tai Lue"/>
+        <a:font script="Tfng" typeface="Ebrima"/>
+      </a:minorFont>
+    </a:fontScheme>
+    <a:fmtScheme name="Office">
+      <a:fillStyleLst>
+        <a:solidFill>
+          <a:schemeClr val="phClr"/>
+        </a:solidFill>
+        <a:gradFill rotWithShape="1">
+          <a:gsLst>
+            <a:gs pos="0">
+              <a:schemeClr val="phClr">
+                <a:lumMod val="110000"/>
+                <a:satMod val="105000"/>
+                <a:tint val="67000"/>
+              </a:schemeClr>
+            </a:gs>
+            <a:gs pos="50000">
+              <a:schemeClr val="phClr">
+                <a:lumMod val="105000"/>
+                <a:satMod val="103000"/>
+                <a:tint val="73000"/>
+              </a:schemeClr>
+            </a:gs>
+            <a:gs pos="100000">
+              <a:schemeClr val="phClr">
+                <a:lumMod val="105000"/>
+                <a:satMod val="109000"/>
+                <a:tint val="81000"/>
+              </a:schemeClr>
+            </a:gs>
+          </a:gsLst>
+          <a:lin ang="5400000" scaled="0"/>
+        </a:gradFill>
+        <a:gradFill rotWithShape="1">
+          <a:gsLst>
+            <a:gs pos="0">
+              <a:schemeClr val="phClr">
+                <a:satMod val="103000"/>
+                <a:lumMod val="102000"/>
+                <a:tint val="94000"/>
+              </a:schemeClr>
+            </a:gs>
+            <a:gs pos="50000">
+              <a:schemeClr val="phClr">
+                <a:satMod val="110000"/>
+                <a:lumMod val="100000"/>
+                <a:shade val="100000"/>
+              </a:schemeClr>
+            </a:gs>
+            <a:gs pos="100000">
+              <a:schemeClr val="phClr">
+                <a:lumMod val="99000"/>
+                <a:satMod val="120000"/>
+                <a:shade val="78000"/>
+              </a:schemeClr>
+            </a:gs>
+          </a:gsLst>
+          <a:lin ang="5400000" scaled="0"/>
+        </a:gradFill>
+      </a:fillStyleLst>
+      <a:lnStyleLst>
+        <a:ln w="6350" cap="flat" cmpd="sng" algn="ctr">
+          <a:solidFill>
+            <a:schemeClr val="phClr"/>
+          </a:solidFill>
+          <a:prstDash val="solid"/>
+          <a:miter lim="800000"/>
+        </a:ln>
+        <a:ln w="12700" cap="flat" cmpd="sng" algn="ctr">
+          <a:solidFill>
+            <a:schemeClr val="phClr"/>
+          </a:solidFill>
+          <a:prstDash val="solid"/>
+          <a:miter lim="800000"/>
+        </a:ln>
+        <a:ln w="19050" cap="flat" cmpd="sng" algn="ctr">
+          <a:solidFill>
+            <a:schemeClr val="phClr"/>
+          </a:solidFill>
+          <a:prstDash val="solid"/>
+          <a:miter lim="800000"/>
+        </a:ln>
+      </a:lnStyleLst>
+      <a:effectStyleLst>
+        <a:effectStyle>
+          <a:effectLst/>
+        </a:effectStyle>
+        <a:effectStyle>
+          <a:effectLst/>
+        </a:effectStyle>
+        <a:effectStyle>
+          <a:effectLst>
+            <a:outerShdw blurRad="57150" dist="19050" dir="5400000" algn="ctr" rotWithShape="0">
+              <a:srgbClr val="000000">
+                <a:alpha val="63000"/>
+              </a:srgbClr>
+            </a:outerShdw>
+          </a:effectLst>
+        </a:effectStyle>
+      </a:effectStyleLst>
+      <a:bgFillStyleLst>
+        <a:solidFill>
+          <a:schemeClr val="phClr"/>
+        </a:solidFill>
+        <a:solidFill>
+          <a:schemeClr val="phClr">
+            <a:tint val="95000"/>
+            <a:satMod val="170000"/>
+          </a:schemeClr>
+        </a:solidFill>
+        <a:gradFill rotWithShape="1">
+          <a:gsLst>
+            <a:gs pos="0">
+              <a:schemeClr val="phClr">
+                <a:tint val="93000"/>
+                <a:satMod val="150000"/>
+                <a:shade val="98000"/>
+                <a:lumMod val="102000"/>
+              </a:schemeClr>
+            </a:gs>
+            <a:gs pos="50000">
+              <a:schemeClr val="phClr">
+                <a:tint val="98000"/>
+                <a:satMod val="130000"/>
+                <a:shade val="90000"/>
+                <a:lumMod val="103000"/>
+              </a:schemeClr>
+            </a:gs>
+            <a:gs pos="100000">
+              <a:schemeClr val="phClr">
+                <a:shade val="63000"/>
+                <a:satMod val="120000"/>
+              </a:schemeClr>
+            </a:gs>
+          </a:gsLst>
+          <a:lin ang="5400000" scaled="0"/>
+        </a:gradFill>
+      </a:bgFillStyleLst>
+    </a:fmtScheme>
+  </a:themeElements>
+  <a:objectDefaults/>
+  <a:extraClrSchemeLst/>
+  <a:extLst>
+    <a:ext uri="{05A4C25C-085E-4340-85A3-A5531E510DB2}">
+      <thm15:themeFamily xmlns:thm15="http://schemas.microsoft.com/office/thememl/2012/main" name="Office Theme" id="{62F939B6-93AF-4DB8-9C6B-D6C7DFDC589F}" vid="{4A3C46E8-61CC-4603-A589-7422A47A8E4A}"/>
+    </a:ext>
+  </a:extLst>
+</a:theme>
 </file>
</xml_diff>